<commit_message>
change figure 2 a bit
</commit_message>
<xml_diff>
--- a/Figures_milestone/schematic.pptx
+++ b/Figures_milestone/schematic.pptx
@@ -260,7 +260,7 @@
           <a:p>
             <a:fld id="{69C342C8-EDAE-AC43-A265-3DF22E858D75}" type="datetimeFigureOut">
               <a:rPr lang="en-US" smtClean="0"/>
-              <a:t>11/27/20</a:t>
+              <a:t>11/28/20</a:t>
             </a:fld>
             <a:endParaRPr lang="en-US"/>
           </a:p>
@@ -458,7 +458,7 @@
           <a:p>
             <a:fld id="{69C342C8-EDAE-AC43-A265-3DF22E858D75}" type="datetimeFigureOut">
               <a:rPr lang="en-US" smtClean="0"/>
-              <a:t>11/27/20</a:t>
+              <a:t>11/28/20</a:t>
             </a:fld>
             <a:endParaRPr lang="en-US"/>
           </a:p>
@@ -666,7 +666,7 @@
           <a:p>
             <a:fld id="{69C342C8-EDAE-AC43-A265-3DF22E858D75}" type="datetimeFigureOut">
               <a:rPr lang="en-US" smtClean="0"/>
-              <a:t>11/27/20</a:t>
+              <a:t>11/28/20</a:t>
             </a:fld>
             <a:endParaRPr lang="en-US"/>
           </a:p>
@@ -864,7 +864,7 @@
           <a:p>
             <a:fld id="{69C342C8-EDAE-AC43-A265-3DF22E858D75}" type="datetimeFigureOut">
               <a:rPr lang="en-US" smtClean="0"/>
-              <a:t>11/27/20</a:t>
+              <a:t>11/28/20</a:t>
             </a:fld>
             <a:endParaRPr lang="en-US"/>
           </a:p>
@@ -1139,7 +1139,7 @@
           <a:p>
             <a:fld id="{69C342C8-EDAE-AC43-A265-3DF22E858D75}" type="datetimeFigureOut">
               <a:rPr lang="en-US" smtClean="0"/>
-              <a:t>11/27/20</a:t>
+              <a:t>11/28/20</a:t>
             </a:fld>
             <a:endParaRPr lang="en-US"/>
           </a:p>
@@ -1404,7 +1404,7 @@
           <a:p>
             <a:fld id="{69C342C8-EDAE-AC43-A265-3DF22E858D75}" type="datetimeFigureOut">
               <a:rPr lang="en-US" smtClean="0"/>
-              <a:t>11/27/20</a:t>
+              <a:t>11/28/20</a:t>
             </a:fld>
             <a:endParaRPr lang="en-US"/>
           </a:p>
@@ -1816,7 +1816,7 @@
           <a:p>
             <a:fld id="{69C342C8-EDAE-AC43-A265-3DF22E858D75}" type="datetimeFigureOut">
               <a:rPr lang="en-US" smtClean="0"/>
-              <a:t>11/27/20</a:t>
+              <a:t>11/28/20</a:t>
             </a:fld>
             <a:endParaRPr lang="en-US"/>
           </a:p>
@@ -1957,7 +1957,7 @@
           <a:p>
             <a:fld id="{69C342C8-EDAE-AC43-A265-3DF22E858D75}" type="datetimeFigureOut">
               <a:rPr lang="en-US" smtClean="0"/>
-              <a:t>11/27/20</a:t>
+              <a:t>11/28/20</a:t>
             </a:fld>
             <a:endParaRPr lang="en-US"/>
           </a:p>
@@ -2070,7 +2070,7 @@
           <a:p>
             <a:fld id="{69C342C8-EDAE-AC43-A265-3DF22E858D75}" type="datetimeFigureOut">
               <a:rPr lang="en-US" smtClean="0"/>
-              <a:t>11/27/20</a:t>
+              <a:t>11/28/20</a:t>
             </a:fld>
             <a:endParaRPr lang="en-US"/>
           </a:p>
@@ -2381,7 +2381,7 @@
           <a:p>
             <a:fld id="{69C342C8-EDAE-AC43-A265-3DF22E858D75}" type="datetimeFigureOut">
               <a:rPr lang="en-US" smtClean="0"/>
-              <a:t>11/27/20</a:t>
+              <a:t>11/28/20</a:t>
             </a:fld>
             <a:endParaRPr lang="en-US"/>
           </a:p>
@@ -2669,7 +2669,7 @@
           <a:p>
             <a:fld id="{69C342C8-EDAE-AC43-A265-3DF22E858D75}" type="datetimeFigureOut">
               <a:rPr lang="en-US" smtClean="0"/>
-              <a:t>11/27/20</a:t>
+              <a:t>11/28/20</a:t>
             </a:fld>
             <a:endParaRPr lang="en-US"/>
           </a:p>
@@ -2910,7 +2910,7 @@
           <a:p>
             <a:fld id="{69C342C8-EDAE-AC43-A265-3DF22E858D75}" type="datetimeFigureOut">
               <a:rPr lang="en-US" smtClean="0"/>
-              <a:t>11/27/20</a:t>
+              <a:t>11/28/20</a:t>
             </a:fld>
             <a:endParaRPr lang="en-US"/>
           </a:p>
@@ -9070,10 +9070,10 @@
       </p:grpSpPr>
       <p:grpSp>
         <p:nvGrpSpPr>
-          <p:cNvPr id="121" name="Group 120">
+          <p:cNvPr id="9" name="Group 8">
             <a:extLst>
               <a:ext uri="{FF2B5EF4-FFF2-40B4-BE49-F238E27FC236}">
-                <a16:creationId xmlns:a16="http://schemas.microsoft.com/office/drawing/2014/main" id="{B9F6DBD7-1548-A248-A6F8-12957BF2273C}"/>
+                <a16:creationId xmlns:a16="http://schemas.microsoft.com/office/drawing/2014/main" id="{4DFE1EDC-9A5E-024D-A782-90A9D25EA35A}"/>
               </a:ext>
             </a:extLst>
           </p:cNvPr>
@@ -9082,10 +9082,10 @@
         </p:nvGrpSpPr>
         <p:grpSpPr>
           <a:xfrm>
-            <a:off x="2108019" y="895189"/>
-            <a:ext cx="7720225" cy="4803084"/>
-            <a:chOff x="2108019" y="895189"/>
-            <a:chExt cx="7720225" cy="4803084"/>
+            <a:off x="2118067" y="936484"/>
+            <a:ext cx="7703239" cy="4925847"/>
+            <a:chOff x="2118067" y="936484"/>
+            <a:chExt cx="7703239" cy="4925847"/>
           </a:xfrm>
         </p:grpSpPr>
         <p:sp>
@@ -9102,8 +9102,8 @@
           </p:nvSpPr>
           <p:spPr>
             <a:xfrm>
-              <a:off x="2108019" y="906340"/>
-              <a:ext cx="7642387" cy="4791933"/>
+              <a:off x="2118067" y="936484"/>
+              <a:ext cx="7642387" cy="4925847"/>
             </a:xfrm>
             <a:prstGeom prst="rect">
               <a:avLst/>
@@ -9113,200 +9113,6 @@
             </a:solidFill>
             <a:ln>
               <a:noFill/>
-            </a:ln>
-          </p:spPr>
-          <p:style>
-            <a:lnRef idx="2">
-              <a:schemeClr val="accent1">
-                <a:shade val="50000"/>
-              </a:schemeClr>
-            </a:lnRef>
-            <a:fillRef idx="1">
-              <a:schemeClr val="accent1"/>
-            </a:fillRef>
-            <a:effectRef idx="0">
-              <a:schemeClr val="accent1"/>
-            </a:effectRef>
-            <a:fontRef idx="minor">
-              <a:schemeClr val="lt1"/>
-            </a:fontRef>
-          </p:style>
-          <p:txBody>
-            <a:bodyPr rtlCol="0" anchor="ctr"/>
-            <a:lstStyle/>
-            <a:p>
-              <a:pPr algn="ctr"/>
-              <a:endParaRPr lang="en-US"/>
-            </a:p>
-          </p:txBody>
-        </p:sp>
-        <p:sp>
-          <p:nvSpPr>
-            <p:cNvPr id="134" name="Rectangle 133">
-              <a:extLst>
-                <a:ext uri="{FF2B5EF4-FFF2-40B4-BE49-F238E27FC236}">
-                  <a16:creationId xmlns:a16="http://schemas.microsoft.com/office/drawing/2014/main" id="{F4D36D8E-482A-FC41-A1C2-B1EA9B9BE901}"/>
-                </a:ext>
-              </a:extLst>
-            </p:cNvPr>
-            <p:cNvSpPr/>
-            <p:nvPr/>
-          </p:nvSpPr>
-          <p:spPr>
-            <a:xfrm>
-              <a:off x="2278841" y="4359307"/>
-              <a:ext cx="1310827" cy="1080042"/>
-            </a:xfrm>
-            <a:prstGeom prst="rect">
-              <a:avLst/>
-            </a:prstGeom>
-            <a:solidFill>
-              <a:schemeClr val="bg2">
-                <a:lumMod val="50000"/>
-              </a:schemeClr>
-            </a:solidFill>
-            <a:ln>
-              <a:solidFill>
-                <a:schemeClr val="bg1"/>
-              </a:solidFill>
-            </a:ln>
-          </p:spPr>
-          <p:style>
-            <a:lnRef idx="2">
-              <a:schemeClr val="accent1">
-                <a:shade val="50000"/>
-              </a:schemeClr>
-            </a:lnRef>
-            <a:fillRef idx="1">
-              <a:schemeClr val="accent1"/>
-            </a:fillRef>
-            <a:effectRef idx="0">
-              <a:schemeClr val="accent1"/>
-            </a:effectRef>
-            <a:fontRef idx="minor">
-              <a:schemeClr val="lt1"/>
-            </a:fontRef>
-          </p:style>
-          <p:txBody>
-            <a:bodyPr rtlCol="0" anchor="ctr"/>
-            <a:lstStyle/>
-            <a:p>
-              <a:pPr algn="ctr"/>
-              <a:endParaRPr lang="en-US"/>
-            </a:p>
-          </p:txBody>
-        </p:sp>
-        <p:sp>
-          <p:nvSpPr>
-            <p:cNvPr id="135" name="Rectangle 134">
-              <a:extLst>
-                <a:ext uri="{FF2B5EF4-FFF2-40B4-BE49-F238E27FC236}">
-                  <a16:creationId xmlns:a16="http://schemas.microsoft.com/office/drawing/2014/main" id="{6F0B5647-8F85-2A46-A3BF-6FDF098BFC9B}"/>
-                </a:ext>
-              </a:extLst>
-            </p:cNvPr>
-            <p:cNvSpPr/>
-            <p:nvPr/>
-          </p:nvSpPr>
-          <p:spPr>
-            <a:xfrm>
-              <a:off x="2368179" y="4436033"/>
-              <a:ext cx="1310827" cy="1080042"/>
-            </a:xfrm>
-            <a:prstGeom prst="rect">
-              <a:avLst/>
-            </a:prstGeom>
-            <a:solidFill>
-              <a:schemeClr val="bg2">
-                <a:lumMod val="50000"/>
-              </a:schemeClr>
-            </a:solidFill>
-            <a:ln>
-              <a:solidFill>
-                <a:schemeClr val="bg1"/>
-              </a:solidFill>
-            </a:ln>
-          </p:spPr>
-          <p:style>
-            <a:lnRef idx="2">
-              <a:schemeClr val="accent1">
-                <a:shade val="50000"/>
-              </a:schemeClr>
-            </a:lnRef>
-            <a:fillRef idx="1">
-              <a:schemeClr val="accent1"/>
-            </a:fillRef>
-            <a:effectRef idx="0">
-              <a:schemeClr val="accent1"/>
-            </a:effectRef>
-            <a:fontRef idx="minor">
-              <a:schemeClr val="lt1"/>
-            </a:fontRef>
-          </p:style>
-          <p:txBody>
-            <a:bodyPr rtlCol="0" anchor="ctr"/>
-            <a:lstStyle/>
-            <a:p>
-              <a:pPr algn="ctr"/>
-              <a:endParaRPr lang="en-US"/>
-            </a:p>
-          </p:txBody>
-        </p:sp>
-        <p:pic>
-          <p:nvPicPr>
-            <p:cNvPr id="3" name="Picture 2">
-              <a:extLst>
-                <a:ext uri="{FF2B5EF4-FFF2-40B4-BE49-F238E27FC236}">
-                  <a16:creationId xmlns:a16="http://schemas.microsoft.com/office/drawing/2014/main" id="{51607E83-74E9-9843-A105-DB2AC2976195}"/>
-                </a:ext>
-              </a:extLst>
-            </p:cNvPr>
-            <p:cNvPicPr>
-              <a:picLocks noChangeAspect="1"/>
-            </p:cNvPicPr>
-            <p:nvPr/>
-          </p:nvPicPr>
-          <p:blipFill>
-            <a:blip r:embed="rId2"/>
-            <a:stretch>
-              <a:fillRect/>
-            </a:stretch>
-          </p:blipFill>
-          <p:spPr>
-            <a:xfrm>
-              <a:off x="2447529" y="4512759"/>
-              <a:ext cx="1320815" cy="1080042"/>
-            </a:xfrm>
-            <a:prstGeom prst="rect">
-              <a:avLst/>
-            </a:prstGeom>
-          </p:spPr>
-        </p:pic>
-        <p:sp>
-          <p:nvSpPr>
-            <p:cNvPr id="141" name="Rectangle 140">
-              <a:extLst>
-                <a:ext uri="{FF2B5EF4-FFF2-40B4-BE49-F238E27FC236}">
-                  <a16:creationId xmlns:a16="http://schemas.microsoft.com/office/drawing/2014/main" id="{62673EA8-C410-4241-8056-9CADD4728B23}"/>
-                </a:ext>
-              </a:extLst>
-            </p:cNvPr>
-            <p:cNvSpPr/>
-            <p:nvPr/>
-          </p:nvSpPr>
-          <p:spPr>
-            <a:xfrm rot="5400000">
-              <a:off x="3071411" y="5193825"/>
-              <a:ext cx="102307" cy="185738"/>
-            </a:xfrm>
-            <a:prstGeom prst="rect">
-              <a:avLst/>
-            </a:prstGeom>
-            <a:noFill/>
-            <a:ln>
-              <a:solidFill>
-                <a:schemeClr val="tx1"/>
-              </a:solidFill>
             </a:ln>
           </p:spPr>
           <p:style>
@@ -9348,7 +9154,7 @@
           </p:nvSpPr>
           <p:spPr>
             <a:xfrm>
-              <a:off x="3869645" y="4391297"/>
+              <a:off x="3913889" y="4538777"/>
               <a:ext cx="1098049" cy="904726"/>
             </a:xfrm>
             <a:prstGeom prst="rect">
@@ -9404,7 +9210,7 @@
           </p:nvSpPr>
           <p:spPr>
             <a:xfrm>
-              <a:off x="3977643" y="4474837"/>
+              <a:off x="4021887" y="4622317"/>
               <a:ext cx="1098049" cy="904726"/>
             </a:xfrm>
             <a:prstGeom prst="rect">
@@ -9460,7 +9266,7 @@
           </p:nvSpPr>
           <p:spPr>
             <a:xfrm>
-              <a:off x="4096022" y="4576478"/>
+              <a:off x="4140266" y="4723958"/>
               <a:ext cx="1098049" cy="904726"/>
             </a:xfrm>
             <a:prstGeom prst="rect">
@@ -9516,7 +9322,7 @@
           </p:nvSpPr>
           <p:spPr>
             <a:xfrm>
-              <a:off x="4214401" y="4672394"/>
+              <a:off x="4258645" y="4819874"/>
               <a:ext cx="1098049" cy="904726"/>
             </a:xfrm>
             <a:prstGeom prst="rect">
@@ -9558,98 +9364,6 @@
             </a:p>
           </p:txBody>
         </p:sp>
-        <p:cxnSp>
-          <p:nvCxnSpPr>
-            <p:cNvPr id="152" name="Straight Connector 151">
-              <a:extLst>
-                <a:ext uri="{FF2B5EF4-FFF2-40B4-BE49-F238E27FC236}">
-                  <a16:creationId xmlns:a16="http://schemas.microsoft.com/office/drawing/2014/main" id="{CF07DBD7-973C-B244-AE52-E1CD022BBF90}"/>
-                </a:ext>
-              </a:extLst>
-            </p:cNvPr>
-            <p:cNvCxnSpPr>
-              <a:cxnSpLocks/>
-              <a:stCxn id="141" idx="1"/>
-              <a:endCxn id="149" idx="0"/>
-            </p:cNvCxnSpPr>
-            <p:nvPr/>
-          </p:nvCxnSpPr>
-          <p:spPr>
-            <a:xfrm flipV="1">
-              <a:off x="3122565" y="4672394"/>
-              <a:ext cx="1640861" cy="563147"/>
-            </a:xfrm>
-            <a:prstGeom prst="line">
-              <a:avLst/>
-            </a:prstGeom>
-            <a:ln w="19050">
-              <a:solidFill>
-                <a:srgbClr val="0070C0"/>
-              </a:solidFill>
-              <a:prstDash val="sysDash"/>
-            </a:ln>
-          </p:spPr>
-          <p:style>
-            <a:lnRef idx="1">
-              <a:schemeClr val="accent1"/>
-            </a:lnRef>
-            <a:fillRef idx="0">
-              <a:schemeClr val="accent1"/>
-            </a:fillRef>
-            <a:effectRef idx="0">
-              <a:schemeClr val="accent1"/>
-            </a:effectRef>
-            <a:fontRef idx="minor">
-              <a:schemeClr val="tx1"/>
-            </a:fontRef>
-          </p:style>
-        </p:cxnSp>
-        <p:cxnSp>
-          <p:nvCxnSpPr>
-            <p:cNvPr id="153" name="Straight Connector 152">
-              <a:extLst>
-                <a:ext uri="{FF2B5EF4-FFF2-40B4-BE49-F238E27FC236}">
-                  <a16:creationId xmlns:a16="http://schemas.microsoft.com/office/drawing/2014/main" id="{57D8329D-95EA-2E48-B35B-865F91FF4445}"/>
-                </a:ext>
-              </a:extLst>
-            </p:cNvPr>
-            <p:cNvCxnSpPr>
-              <a:cxnSpLocks/>
-              <a:stCxn id="141" idx="3"/>
-              <a:endCxn id="149" idx="2"/>
-            </p:cNvCxnSpPr>
-            <p:nvPr/>
-          </p:nvCxnSpPr>
-          <p:spPr>
-            <a:xfrm>
-              <a:off x="3122565" y="5337848"/>
-              <a:ext cx="1640861" cy="239272"/>
-            </a:xfrm>
-            <a:prstGeom prst="line">
-              <a:avLst/>
-            </a:prstGeom>
-            <a:ln w="19050">
-              <a:solidFill>
-                <a:srgbClr val="0070C0"/>
-              </a:solidFill>
-              <a:prstDash val="sysDash"/>
-            </a:ln>
-          </p:spPr>
-          <p:style>
-            <a:lnRef idx="1">
-              <a:schemeClr val="accent1"/>
-            </a:lnRef>
-            <a:fillRef idx="0">
-              <a:schemeClr val="accent1"/>
-            </a:fillRef>
-            <a:effectRef idx="0">
-              <a:schemeClr val="accent1"/>
-            </a:effectRef>
-            <a:fontRef idx="minor">
-              <a:schemeClr val="tx1"/>
-            </a:fontRef>
-          </p:style>
-        </p:cxnSp>
         <p:sp>
           <p:nvSpPr>
             <p:cNvPr id="155" name="Rectangle 154">
@@ -9664,7 +9378,7 @@
           </p:nvSpPr>
           <p:spPr>
             <a:xfrm>
-              <a:off x="5373303" y="4655913"/>
+              <a:off x="5417547" y="4803393"/>
               <a:ext cx="669299" cy="551462"/>
             </a:xfrm>
             <a:prstGeom prst="rect">
@@ -9720,7 +9434,7 @@
           </p:nvSpPr>
           <p:spPr>
             <a:xfrm>
-              <a:off x="5481301" y="4739453"/>
+              <a:off x="5525545" y="4886933"/>
               <a:ext cx="669299" cy="551462"/>
             </a:xfrm>
             <a:prstGeom prst="rect">
@@ -9776,7 +9490,7 @@
           </p:nvSpPr>
           <p:spPr>
             <a:xfrm>
-              <a:off x="5599680" y="4841094"/>
+              <a:off x="5643924" y="4988574"/>
               <a:ext cx="669299" cy="551462"/>
             </a:xfrm>
             <a:prstGeom prst="rect">
@@ -9832,7 +9546,7 @@
           </p:nvSpPr>
           <p:spPr>
             <a:xfrm>
-              <a:off x="5718059" y="4937010"/>
+              <a:off x="5762303" y="5084490"/>
               <a:ext cx="669299" cy="551462"/>
             </a:xfrm>
             <a:prstGeom prst="rect">
@@ -9888,7 +9602,7 @@
           </p:nvSpPr>
           <p:spPr>
             <a:xfrm>
-              <a:off x="6042602" y="5178698"/>
+              <a:off x="6086846" y="5326178"/>
               <a:ext cx="179811" cy="185738"/>
             </a:xfrm>
             <a:prstGeom prst="rect">
@@ -9943,7 +9657,7 @@
           </p:nvCxnSpPr>
           <p:spPr>
             <a:xfrm flipV="1">
-              <a:off x="4841993" y="4937010"/>
+              <a:off x="4886237" y="5084490"/>
               <a:ext cx="1210716" cy="275731"/>
             </a:xfrm>
             <a:prstGeom prst="line">
@@ -9989,7 +9703,7 @@
           </p:nvCxnSpPr>
           <p:spPr>
             <a:xfrm>
-              <a:off x="4841147" y="5329888"/>
+              <a:off x="4885391" y="5477368"/>
               <a:ext cx="1211562" cy="158584"/>
             </a:xfrm>
             <a:prstGeom prst="line">
@@ -10031,7 +9745,7 @@
           </p:nvSpPr>
           <p:spPr>
             <a:xfrm>
-              <a:off x="6448210" y="4712168"/>
+              <a:off x="6492454" y="4859648"/>
               <a:ext cx="550264" cy="453384"/>
             </a:xfrm>
             <a:prstGeom prst="rect">
@@ -10087,7 +9801,7 @@
           </p:nvSpPr>
           <p:spPr>
             <a:xfrm>
-              <a:off x="6510369" y="4775801"/>
+              <a:off x="6554613" y="4923281"/>
               <a:ext cx="550264" cy="453384"/>
             </a:xfrm>
             <a:prstGeom prst="rect">
@@ -10143,7 +9857,7 @@
           </p:nvSpPr>
           <p:spPr>
             <a:xfrm>
-              <a:off x="6583357" y="4841564"/>
+              <a:off x="6627601" y="4989044"/>
               <a:ext cx="550264" cy="453384"/>
             </a:xfrm>
             <a:prstGeom prst="rect">
@@ -10199,7 +9913,7 @@
           </p:nvSpPr>
           <p:spPr>
             <a:xfrm>
-              <a:off x="6656345" y="4902484"/>
+              <a:off x="6700589" y="5049964"/>
               <a:ext cx="550264" cy="453384"/>
             </a:xfrm>
             <a:prstGeom prst="rect">
@@ -10255,7 +9969,7 @@
           </p:nvSpPr>
           <p:spPr>
             <a:xfrm>
-              <a:off x="6729333" y="4972475"/>
+              <a:off x="6773577" y="5119955"/>
               <a:ext cx="550264" cy="453384"/>
             </a:xfrm>
             <a:prstGeom prst="rect">
@@ -10311,7 +10025,7 @@
           </p:nvSpPr>
           <p:spPr>
             <a:xfrm>
-              <a:off x="6811943" y="5052780"/>
+              <a:off x="6856187" y="5200260"/>
               <a:ext cx="550264" cy="453384"/>
             </a:xfrm>
             <a:prstGeom prst="rect">
@@ -10371,7 +10085,7 @@
           </p:nvCxnSpPr>
           <p:spPr>
             <a:xfrm flipV="1">
-              <a:off x="6132508" y="5052780"/>
+              <a:off x="6176752" y="5200260"/>
               <a:ext cx="954567" cy="125918"/>
             </a:xfrm>
             <a:prstGeom prst="line">
@@ -10417,7 +10131,7 @@
           </p:nvCxnSpPr>
           <p:spPr>
             <a:xfrm>
-              <a:off x="6132508" y="5364436"/>
+              <a:off x="6176752" y="5511916"/>
               <a:ext cx="954567" cy="141728"/>
             </a:xfrm>
             <a:prstGeom prst="line">
@@ -10459,7 +10173,7 @@
           </p:nvSpPr>
           <p:spPr>
             <a:xfrm>
-              <a:off x="7410087" y="4946765"/>
+              <a:off x="7454331" y="5094245"/>
               <a:ext cx="320489" cy="264063"/>
             </a:xfrm>
             <a:prstGeom prst="rect">
@@ -10515,7 +10229,7 @@
           </p:nvSpPr>
           <p:spPr>
             <a:xfrm>
-              <a:off x="7464364" y="4994634"/>
+              <a:off x="7508608" y="5142114"/>
               <a:ext cx="320489" cy="264063"/>
             </a:xfrm>
             <a:prstGeom prst="rect">
@@ -10571,7 +10285,7 @@
           </p:nvSpPr>
           <p:spPr>
             <a:xfrm>
-              <a:off x="7521588" y="5044633"/>
+              <a:off x="7565832" y="5192113"/>
               <a:ext cx="320489" cy="264063"/>
             </a:xfrm>
             <a:prstGeom prst="rect">
@@ -10627,7 +10341,7 @@
           </p:nvSpPr>
           <p:spPr>
             <a:xfrm>
-              <a:off x="7574867" y="5093729"/>
+              <a:off x="7619111" y="5241209"/>
               <a:ext cx="320489" cy="264063"/>
             </a:xfrm>
             <a:prstGeom prst="rect">
@@ -10683,7 +10397,7 @@
           </p:nvSpPr>
           <p:spPr>
             <a:xfrm>
-              <a:off x="7628150" y="5144013"/>
+              <a:off x="7672394" y="5291493"/>
               <a:ext cx="320489" cy="264063"/>
             </a:xfrm>
             <a:prstGeom prst="rect">
@@ -10739,7 +10453,7 @@
           </p:nvSpPr>
           <p:spPr>
             <a:xfrm>
-              <a:off x="7677887" y="5192482"/>
+              <a:off x="7722131" y="5339962"/>
               <a:ext cx="320489" cy="264063"/>
             </a:xfrm>
             <a:prstGeom prst="rect">
@@ -10799,7 +10513,7 @@
           </p:nvCxnSpPr>
           <p:spPr>
             <a:xfrm flipV="1">
-              <a:off x="7174926" y="5192482"/>
+              <a:off x="7219170" y="5339962"/>
               <a:ext cx="663206" cy="98434"/>
             </a:xfrm>
             <a:prstGeom prst="line">
@@ -10844,7 +10558,7 @@
           </p:nvCxnSpPr>
           <p:spPr>
             <a:xfrm>
-              <a:off x="7182820" y="5402640"/>
+              <a:off x="7227064" y="5550120"/>
               <a:ext cx="655312" cy="53905"/>
             </a:xfrm>
             <a:prstGeom prst="line">
@@ -10886,7 +10600,7 @@
           </p:nvSpPr>
           <p:spPr>
             <a:xfrm>
-              <a:off x="8042090" y="4336967"/>
+              <a:off x="8086334" y="4484447"/>
               <a:ext cx="178890" cy="178890"/>
             </a:xfrm>
             <a:prstGeom prst="rect">
@@ -10943,7 +10657,7 @@
           </p:nvSpPr>
           <p:spPr>
             <a:xfrm>
-              <a:off x="8042090" y="4581225"/>
+              <a:off x="8086334" y="4728705"/>
               <a:ext cx="178890" cy="178890"/>
             </a:xfrm>
             <a:prstGeom prst="rect">
@@ -11000,7 +10714,7 @@
           </p:nvSpPr>
           <p:spPr>
             <a:xfrm>
-              <a:off x="8042090" y="4820145"/>
+              <a:off x="8086334" y="4967625"/>
               <a:ext cx="178890" cy="178890"/>
             </a:xfrm>
             <a:prstGeom prst="rect">
@@ -11057,7 +10771,7 @@
           </p:nvSpPr>
           <p:spPr>
             <a:xfrm rot="5400000">
-              <a:off x="7989433" y="5068684"/>
+              <a:off x="8033677" y="5216164"/>
               <a:ext cx="401773" cy="338554"/>
             </a:xfrm>
             <a:prstGeom prst="rect">
@@ -11093,7 +10807,7 @@
           </p:nvSpPr>
           <p:spPr>
             <a:xfrm>
-              <a:off x="8043545" y="5424590"/>
+              <a:off x="8087789" y="5572070"/>
               <a:ext cx="178890" cy="178890"/>
             </a:xfrm>
             <a:prstGeom prst="rect">
@@ -11150,7 +10864,7 @@
           </p:nvSpPr>
           <p:spPr>
             <a:xfrm>
-              <a:off x="8685253" y="4505502"/>
+              <a:off x="8729497" y="4652982"/>
               <a:ext cx="178890" cy="178890"/>
             </a:xfrm>
             <a:prstGeom prst="ellipse">
@@ -11210,7 +10924,7 @@
           </p:nvCxnSpPr>
           <p:spPr>
             <a:xfrm>
-              <a:off x="8224170" y="4437512"/>
+              <a:off x="8268414" y="4584992"/>
               <a:ext cx="461083" cy="157435"/>
             </a:xfrm>
             <a:prstGeom prst="line">
@@ -11251,7 +10965,7 @@
           </p:nvSpPr>
           <p:spPr>
             <a:xfrm>
-              <a:off x="8685253" y="4809790"/>
+              <a:off x="8729497" y="4957270"/>
               <a:ext cx="178890" cy="178890"/>
             </a:xfrm>
             <a:prstGeom prst="ellipse">
@@ -11308,7 +11022,7 @@
           </p:nvSpPr>
           <p:spPr>
             <a:xfrm>
-              <a:off x="8685087" y="5309442"/>
+              <a:off x="8729331" y="5456922"/>
               <a:ext cx="178890" cy="178890"/>
             </a:xfrm>
             <a:prstGeom prst="ellipse">
@@ -11369,7 +11083,7 @@
           </p:nvCxnSpPr>
           <p:spPr>
             <a:xfrm flipV="1">
-              <a:off x="8220980" y="4594947"/>
+              <a:off x="8265224" y="4742427"/>
               <a:ext cx="464273" cy="75723"/>
             </a:xfrm>
             <a:prstGeom prst="line">
@@ -11414,7 +11128,7 @@
           </p:nvCxnSpPr>
           <p:spPr>
             <a:xfrm flipV="1">
-              <a:off x="8220980" y="4594947"/>
+              <a:off x="8265224" y="4742427"/>
               <a:ext cx="464273" cy="314643"/>
             </a:xfrm>
             <a:prstGeom prst="line">
@@ -11458,7 +11172,7 @@
           </p:nvCxnSpPr>
           <p:spPr>
             <a:xfrm flipV="1">
-              <a:off x="8226996" y="4594947"/>
+              <a:off x="8271240" y="4742427"/>
               <a:ext cx="458257" cy="911217"/>
             </a:xfrm>
             <a:prstGeom prst="line">
@@ -11499,7 +11213,7 @@
           </p:nvSpPr>
           <p:spPr>
             <a:xfrm rot="5400000">
-              <a:off x="8628407" y="4987629"/>
+              <a:off x="8672651" y="5135109"/>
               <a:ext cx="401773" cy="338554"/>
             </a:xfrm>
             <a:prstGeom prst="rect">
@@ -11538,7 +11252,7 @@
           </p:nvCxnSpPr>
           <p:spPr>
             <a:xfrm>
-              <a:off x="8219703" y="4428391"/>
+              <a:off x="8263947" y="4575871"/>
               <a:ext cx="465550" cy="470844"/>
             </a:xfrm>
             <a:prstGeom prst="line">
@@ -11583,7 +11297,7 @@
           </p:nvCxnSpPr>
           <p:spPr>
             <a:xfrm>
-              <a:off x="8220980" y="4670670"/>
+              <a:off x="8265224" y="4818150"/>
               <a:ext cx="464273" cy="228565"/>
             </a:xfrm>
             <a:prstGeom prst="line">
@@ -11628,7 +11342,7 @@
           </p:nvCxnSpPr>
           <p:spPr>
             <a:xfrm>
-              <a:off x="8220980" y="4670670"/>
+              <a:off x="8265224" y="4818150"/>
               <a:ext cx="464107" cy="728217"/>
             </a:xfrm>
             <a:prstGeom prst="line">
@@ -11673,7 +11387,7 @@
           </p:nvCxnSpPr>
           <p:spPr>
             <a:xfrm flipV="1">
-              <a:off x="8220980" y="4899235"/>
+              <a:off x="8265224" y="5046715"/>
               <a:ext cx="464273" cy="10355"/>
             </a:xfrm>
             <a:prstGeom prst="line">
@@ -11718,7 +11432,7 @@
           </p:nvCxnSpPr>
           <p:spPr>
             <a:xfrm>
-              <a:off x="8220980" y="4909590"/>
+              <a:off x="8265224" y="5057070"/>
               <a:ext cx="464107" cy="489297"/>
             </a:xfrm>
             <a:prstGeom prst="line">
@@ -11763,7 +11477,7 @@
           </p:nvCxnSpPr>
           <p:spPr>
             <a:xfrm flipV="1">
-              <a:off x="8222435" y="4899235"/>
+              <a:off x="8266679" y="5046715"/>
               <a:ext cx="462818" cy="614800"/>
             </a:xfrm>
             <a:prstGeom prst="line">
@@ -11808,7 +11522,7 @@
           </p:nvCxnSpPr>
           <p:spPr>
             <a:xfrm flipV="1">
-              <a:off x="8222435" y="5398887"/>
+              <a:off x="8266679" y="5546367"/>
               <a:ext cx="462652" cy="115148"/>
             </a:xfrm>
             <a:prstGeom prst="line">
@@ -11852,7 +11566,7 @@
           </p:nvCxnSpPr>
           <p:spPr>
             <a:xfrm>
-              <a:off x="8216513" y="4421282"/>
+              <a:off x="8260757" y="4568762"/>
               <a:ext cx="468574" cy="977605"/>
             </a:xfrm>
             <a:prstGeom prst="line">
@@ -11897,7 +11611,7 @@
           </p:nvCxnSpPr>
           <p:spPr>
             <a:xfrm>
-              <a:off x="8864143" y="4594947"/>
+              <a:off x="8908387" y="4742427"/>
               <a:ext cx="299428" cy="350194"/>
             </a:xfrm>
             <a:prstGeom prst="line">
@@ -11938,7 +11652,7 @@
           </p:nvSpPr>
           <p:spPr>
             <a:xfrm>
-              <a:off x="9163571" y="4855696"/>
+              <a:off x="9207815" y="5003176"/>
               <a:ext cx="178890" cy="178890"/>
             </a:xfrm>
             <a:prstGeom prst="rect">
@@ -11999,7 +11713,7 @@
           </p:nvCxnSpPr>
           <p:spPr>
             <a:xfrm>
-              <a:off x="8864143" y="4899235"/>
+              <a:off x="8908387" y="5046715"/>
               <a:ext cx="299428" cy="45906"/>
             </a:xfrm>
             <a:prstGeom prst="line">
@@ -12044,7 +11758,7 @@
           </p:nvCxnSpPr>
           <p:spPr>
             <a:xfrm flipV="1">
-              <a:off x="8863977" y="4945141"/>
+              <a:off x="8908221" y="5092621"/>
               <a:ext cx="299594" cy="453746"/>
             </a:xfrm>
             <a:prstGeom prst="line">
@@ -12121,7 +11835,7 @@
           </p:nvSpPr>
           <p:spPr>
             <a:xfrm>
-              <a:off x="4015433" y="3901138"/>
+              <a:off x="4059677" y="4048618"/>
               <a:ext cx="922414" cy="461665"/>
             </a:xfrm>
             <a:prstGeom prst="rect">
@@ -12157,7 +11871,7 @@
           </p:nvSpPr>
           <p:spPr>
             <a:xfrm>
-              <a:off x="5307138" y="4191895"/>
+              <a:off x="5351382" y="4339375"/>
               <a:ext cx="922414" cy="461665"/>
             </a:xfrm>
             <a:prstGeom prst="rect">
@@ -12193,7 +11907,7 @@
           </p:nvSpPr>
           <p:spPr>
             <a:xfrm>
-              <a:off x="6290405" y="4230601"/>
+              <a:off x="6334649" y="4378081"/>
               <a:ext cx="922414" cy="461665"/>
             </a:xfrm>
             <a:prstGeom prst="rect">
@@ -12229,7 +11943,7 @@
           </p:nvSpPr>
           <p:spPr>
             <a:xfrm>
-              <a:off x="7094161" y="4458132"/>
+              <a:off x="7138405" y="4605612"/>
               <a:ext cx="922414" cy="461665"/>
             </a:xfrm>
             <a:prstGeom prst="rect">
@@ -12265,7 +11979,7 @@
           </p:nvSpPr>
           <p:spPr>
             <a:xfrm>
-              <a:off x="7685760" y="4005163"/>
+              <a:off x="7730004" y="4152643"/>
               <a:ext cx="922414" cy="276999"/>
             </a:xfrm>
             <a:prstGeom prst="rect">
@@ -12301,7 +12015,7 @@
           </p:nvSpPr>
           <p:spPr>
             <a:xfrm>
-              <a:off x="8099294" y="4177921"/>
+              <a:off x="8143538" y="4325401"/>
               <a:ext cx="1300523" cy="276999"/>
             </a:xfrm>
             <a:prstGeom prst="rect">
@@ -12337,8 +12051,8 @@
           </p:nvSpPr>
           <p:spPr>
             <a:xfrm>
-              <a:off x="8905830" y="4540485"/>
-              <a:ext cx="922414" cy="276999"/>
+              <a:off x="8950074" y="4687965"/>
+              <a:ext cx="871232" cy="276999"/>
             </a:xfrm>
             <a:prstGeom prst="rect">
               <a:avLst/>
@@ -12361,10 +12075,10 @@
         </p:sp>
         <p:sp>
           <p:nvSpPr>
-            <p:cNvPr id="247" name="TextBox 246">
-              <a:extLst>
-                <a:ext uri="{FF2B5EF4-FFF2-40B4-BE49-F238E27FC236}">
-                  <a16:creationId xmlns:a16="http://schemas.microsoft.com/office/drawing/2014/main" id="{3002A90C-650F-6341-A459-9F8DDA11F35F}"/>
+            <p:cNvPr id="248" name="TextBox 247">
+              <a:extLst>
+                <a:ext uri="{FF2B5EF4-FFF2-40B4-BE49-F238E27FC236}">
+                  <a16:creationId xmlns:a16="http://schemas.microsoft.com/office/drawing/2014/main" id="{D8848676-BC63-DD41-A866-751097BEEE2F}"/>
                 </a:ext>
               </a:extLst>
             </p:cNvPr>
@@ -12373,43 +12087,7 @@
           </p:nvSpPr>
           <p:spPr>
             <a:xfrm>
-              <a:off x="2605110" y="5140017"/>
-              <a:ext cx="559756" cy="276999"/>
-            </a:xfrm>
-            <a:prstGeom prst="rect">
-              <a:avLst/>
-            </a:prstGeom>
-            <a:noFill/>
-          </p:spPr>
-          <p:txBody>
-            <a:bodyPr wrap="square" rtlCol="0">
-              <a:spAutoFit/>
-            </a:bodyPr>
-            <a:lstStyle/>
-            <a:p>
-              <a:pPr algn="ctr"/>
-              <a:r>
-                <a:rPr lang="en-US" sz="1200" dirty="0"/>
-                <a:t>2x3</a:t>
-              </a:r>
-            </a:p>
-          </p:txBody>
-        </p:sp>
-        <p:sp>
-          <p:nvSpPr>
-            <p:cNvPr id="248" name="TextBox 247">
-              <a:extLst>
-                <a:ext uri="{FF2B5EF4-FFF2-40B4-BE49-F238E27FC236}">
-                  <a16:creationId xmlns:a16="http://schemas.microsoft.com/office/drawing/2014/main" id="{D8848676-BC63-DD41-A866-751097BEEE2F}"/>
-                </a:ext>
-              </a:extLst>
-            </p:cNvPr>
-            <p:cNvSpPr txBox="1"/>
-            <p:nvPr/>
-          </p:nvSpPr>
-          <p:spPr>
-            <a:xfrm>
-              <a:off x="4305233" y="5134896"/>
+              <a:off x="4349477" y="5282376"/>
               <a:ext cx="543843" cy="276999"/>
             </a:xfrm>
             <a:prstGeom prst="rect">
@@ -12445,7 +12123,7 @@
           </p:nvSpPr>
           <p:spPr>
             <a:xfrm>
-              <a:off x="5432760" y="5144013"/>
+              <a:off x="5477004" y="5291493"/>
               <a:ext cx="922414" cy="276999"/>
             </a:xfrm>
             <a:prstGeom prst="rect">
@@ -12481,7 +12159,7 @@
           </p:nvSpPr>
           <p:spPr>
             <a:xfrm>
-              <a:off x="6574525" y="5208631"/>
+              <a:off x="6618769" y="5356111"/>
               <a:ext cx="745488" cy="276999"/>
             </a:xfrm>
             <a:prstGeom prst="rect">
@@ -12517,7 +12195,7 @@
           </p:nvSpPr>
           <p:spPr>
             <a:xfrm rot="5400000">
-              <a:off x="4789993" y="5185865"/>
+              <a:off x="4834237" y="5333345"/>
               <a:ext cx="102307" cy="185738"/>
             </a:xfrm>
             <a:prstGeom prst="rect">
@@ -12569,7 +12247,7 @@
           </p:nvSpPr>
           <p:spPr>
             <a:xfrm rot="5400000">
-              <a:off x="7123772" y="5249200"/>
+              <a:off x="7168016" y="5396680"/>
               <a:ext cx="102307" cy="185738"/>
             </a:xfrm>
             <a:prstGeom prst="rect">
@@ -12621,7 +12299,7 @@
           </p:nvSpPr>
           <p:spPr>
             <a:xfrm>
-              <a:off x="4168892" y="1685414"/>
+              <a:off x="4168892" y="1816038"/>
               <a:ext cx="383486" cy="383486"/>
             </a:xfrm>
             <a:prstGeom prst="rect">
@@ -12678,7 +12356,7 @@
           </p:nvSpPr>
           <p:spPr>
             <a:xfrm>
-              <a:off x="4168894" y="2137822"/>
+              <a:off x="4168894" y="2268446"/>
               <a:ext cx="383486" cy="383486"/>
             </a:xfrm>
             <a:prstGeom prst="rect">
@@ -12735,7 +12413,7 @@
           </p:nvSpPr>
           <p:spPr>
             <a:xfrm>
-              <a:off x="4156508" y="2875713"/>
+              <a:off x="4156508" y="3006337"/>
               <a:ext cx="383486" cy="383486"/>
             </a:xfrm>
             <a:prstGeom prst="rect">
@@ -12792,7 +12470,7 @@
           </p:nvSpPr>
           <p:spPr>
             <a:xfrm>
-              <a:off x="5333329" y="1422794"/>
+              <a:off x="5333329" y="1553418"/>
               <a:ext cx="383486" cy="383486"/>
             </a:xfrm>
             <a:prstGeom prst="ellipse">
@@ -12849,7 +12527,7 @@
           </p:nvSpPr>
           <p:spPr>
             <a:xfrm>
-              <a:off x="5333328" y="2008968"/>
+              <a:off x="5333328" y="2139592"/>
               <a:ext cx="383486" cy="383486"/>
             </a:xfrm>
             <a:prstGeom prst="ellipse">
@@ -12906,7 +12584,7 @@
           </p:nvSpPr>
           <p:spPr>
             <a:xfrm>
-              <a:off x="5333326" y="2983225"/>
+              <a:off x="5333326" y="3113849"/>
               <a:ext cx="383486" cy="383486"/>
             </a:xfrm>
             <a:prstGeom prst="ellipse">
@@ -12963,7 +12641,7 @@
           </p:nvSpPr>
           <p:spPr>
             <a:xfrm rot="5400000">
-              <a:off x="5385918" y="2555139"/>
+              <a:off x="5385918" y="2685763"/>
               <a:ext cx="401773" cy="338554"/>
             </a:xfrm>
             <a:prstGeom prst="rect">
@@ -13003,7 +12681,7 @@
           </p:nvCxnSpPr>
           <p:spPr>
             <a:xfrm flipV="1">
-              <a:off x="4552378" y="1614537"/>
+              <a:off x="4552378" y="1745161"/>
               <a:ext cx="780951" cy="262620"/>
             </a:xfrm>
             <a:prstGeom prst="line">
@@ -13048,7 +12726,7 @@
           </p:nvCxnSpPr>
           <p:spPr>
             <a:xfrm>
-              <a:off x="4552378" y="1877157"/>
+              <a:off x="4552378" y="2007781"/>
               <a:ext cx="780950" cy="323554"/>
             </a:xfrm>
             <a:prstGeom prst="line">
@@ -13093,7 +12771,7 @@
           </p:nvCxnSpPr>
           <p:spPr>
             <a:xfrm>
-              <a:off x="4552378" y="1877157"/>
+              <a:off x="4552378" y="2007781"/>
               <a:ext cx="780948" cy="1297811"/>
             </a:xfrm>
             <a:prstGeom prst="line">
@@ -13138,7 +12816,7 @@
           </p:nvCxnSpPr>
           <p:spPr>
             <a:xfrm flipV="1">
-              <a:off x="4552380" y="1614537"/>
+              <a:off x="4552380" y="1745161"/>
               <a:ext cx="780949" cy="715028"/>
             </a:xfrm>
             <a:prstGeom prst="line">
@@ -13183,7 +12861,7 @@
           </p:nvCxnSpPr>
           <p:spPr>
             <a:xfrm flipV="1">
-              <a:off x="4552380" y="2200711"/>
+              <a:off x="4552380" y="2331335"/>
               <a:ext cx="780948" cy="128854"/>
             </a:xfrm>
             <a:prstGeom prst="line">
@@ -13228,7 +12906,7 @@
           </p:nvCxnSpPr>
           <p:spPr>
             <a:xfrm>
-              <a:off x="4552380" y="2329565"/>
+              <a:off x="4552380" y="2460189"/>
               <a:ext cx="780946" cy="845403"/>
             </a:xfrm>
             <a:prstGeom prst="line">
@@ -13273,7 +12951,7 @@
           </p:nvCxnSpPr>
           <p:spPr>
             <a:xfrm flipV="1">
-              <a:off x="4539994" y="1614537"/>
+              <a:off x="4539994" y="1745161"/>
               <a:ext cx="793335" cy="1452919"/>
             </a:xfrm>
             <a:prstGeom prst="line">
@@ -13318,7 +12996,7 @@
           </p:nvCxnSpPr>
           <p:spPr>
             <a:xfrm flipV="1">
-              <a:off x="4539994" y="2200711"/>
+              <a:off x="4539994" y="2331335"/>
               <a:ext cx="793334" cy="866745"/>
             </a:xfrm>
             <a:prstGeom prst="line">
@@ -13363,7 +13041,7 @@
           </p:nvCxnSpPr>
           <p:spPr>
             <a:xfrm>
-              <a:off x="4539994" y="3067456"/>
+              <a:off x="4539994" y="3198080"/>
               <a:ext cx="793332" cy="107512"/>
             </a:xfrm>
             <a:prstGeom prst="line">
@@ -13404,7 +13082,7 @@
           </p:nvSpPr>
           <p:spPr>
             <a:xfrm>
-              <a:off x="7506107" y="1421407"/>
+              <a:off x="7506107" y="1552031"/>
               <a:ext cx="383486" cy="383486"/>
             </a:xfrm>
             <a:prstGeom prst="ellipse">
@@ -13461,7 +13139,7 @@
           </p:nvSpPr>
           <p:spPr>
             <a:xfrm>
-              <a:off x="7506106" y="2007581"/>
+              <a:off x="7506106" y="2138205"/>
               <a:ext cx="383486" cy="383486"/>
             </a:xfrm>
             <a:prstGeom prst="ellipse">
@@ -13518,7 +13196,7 @@
           </p:nvSpPr>
           <p:spPr>
             <a:xfrm>
-              <a:off x="7506104" y="2981838"/>
+              <a:off x="7506104" y="3112462"/>
               <a:ext cx="383486" cy="383486"/>
             </a:xfrm>
             <a:prstGeom prst="ellipse">
@@ -13575,7 +13253,7 @@
           </p:nvSpPr>
           <p:spPr>
             <a:xfrm rot="5400000">
-              <a:off x="7558696" y="2553752"/>
+              <a:off x="7558696" y="2684376"/>
               <a:ext cx="401773" cy="338554"/>
             </a:xfrm>
             <a:prstGeom prst="rect">
@@ -13611,7 +13289,7 @@
           </p:nvSpPr>
           <p:spPr>
             <a:xfrm>
-              <a:off x="6217787" y="1420899"/>
+              <a:off x="6217787" y="1551523"/>
               <a:ext cx="383486" cy="383486"/>
             </a:xfrm>
             <a:prstGeom prst="rect">
@@ -13668,7 +13346,7 @@
           </p:nvSpPr>
           <p:spPr>
             <a:xfrm>
-              <a:off x="6217787" y="2007073"/>
+              <a:off x="6217787" y="2137697"/>
               <a:ext cx="383486" cy="383486"/>
             </a:xfrm>
             <a:prstGeom prst="rect">
@@ -13725,7 +13403,7 @@
           </p:nvSpPr>
           <p:spPr>
             <a:xfrm>
-              <a:off x="6217781" y="2981330"/>
+              <a:off x="6217781" y="3111954"/>
               <a:ext cx="383486" cy="383486"/>
             </a:xfrm>
             <a:prstGeom prst="rect">
@@ -13786,7 +13464,7 @@
           </p:nvCxnSpPr>
           <p:spPr>
             <a:xfrm flipV="1">
-              <a:off x="5716815" y="1612642"/>
+              <a:off x="5716815" y="1743266"/>
               <a:ext cx="500972" cy="1895"/>
             </a:xfrm>
             <a:prstGeom prst="line">
@@ -13831,7 +13509,7 @@
           </p:nvCxnSpPr>
           <p:spPr>
             <a:xfrm flipV="1">
-              <a:off x="5716814" y="2198816"/>
+              <a:off x="5716814" y="2329440"/>
               <a:ext cx="500973" cy="1895"/>
             </a:xfrm>
             <a:prstGeom prst="line">
@@ -13876,7 +13554,7 @@
           </p:nvCxnSpPr>
           <p:spPr>
             <a:xfrm flipV="1">
-              <a:off x="5716812" y="3173073"/>
+              <a:off x="5716812" y="3303697"/>
               <a:ext cx="500969" cy="1895"/>
             </a:xfrm>
             <a:prstGeom prst="line">
@@ -13921,7 +13599,7 @@
           </p:nvCxnSpPr>
           <p:spPr>
             <a:xfrm>
-              <a:off x="6601273" y="1612642"/>
+              <a:off x="6601273" y="1743266"/>
               <a:ext cx="904834" cy="508"/>
             </a:xfrm>
             <a:prstGeom prst="line">
@@ -13966,7 +13644,7 @@
           </p:nvCxnSpPr>
           <p:spPr>
             <a:xfrm>
-              <a:off x="6601273" y="1612642"/>
+              <a:off x="6601273" y="1743266"/>
               <a:ext cx="904833" cy="586682"/>
             </a:xfrm>
             <a:prstGeom prst="line">
@@ -14011,7 +13689,7 @@
           </p:nvCxnSpPr>
           <p:spPr>
             <a:xfrm>
-              <a:off x="6601273" y="1612642"/>
+              <a:off x="6601273" y="1743266"/>
               <a:ext cx="904831" cy="1560939"/>
             </a:xfrm>
             <a:prstGeom prst="line">
@@ -14056,7 +13734,7 @@
           </p:nvCxnSpPr>
           <p:spPr>
             <a:xfrm flipV="1">
-              <a:off x="6601273" y="1613150"/>
+              <a:off x="6601273" y="1743774"/>
               <a:ext cx="904834" cy="585666"/>
             </a:xfrm>
             <a:prstGeom prst="line">
@@ -14101,7 +13779,7 @@
           </p:nvCxnSpPr>
           <p:spPr>
             <a:xfrm>
-              <a:off x="6601273" y="2198816"/>
+              <a:off x="6601273" y="2329440"/>
               <a:ext cx="904833" cy="508"/>
             </a:xfrm>
             <a:prstGeom prst="line">
@@ -14146,7 +13824,7 @@
           </p:nvCxnSpPr>
           <p:spPr>
             <a:xfrm>
-              <a:off x="6601273" y="2198816"/>
+              <a:off x="6601273" y="2329440"/>
               <a:ext cx="904831" cy="974765"/>
             </a:xfrm>
             <a:prstGeom prst="line">
@@ -14191,7 +13869,7 @@
           </p:nvCxnSpPr>
           <p:spPr>
             <a:xfrm flipV="1">
-              <a:off x="6601267" y="1613150"/>
+              <a:off x="6601267" y="1743774"/>
               <a:ext cx="904840" cy="1559923"/>
             </a:xfrm>
             <a:prstGeom prst="line">
@@ -14236,7 +13914,7 @@
           </p:nvCxnSpPr>
           <p:spPr>
             <a:xfrm flipV="1">
-              <a:off x="6601267" y="2199324"/>
+              <a:off x="6601267" y="2329948"/>
               <a:ext cx="904839" cy="973749"/>
             </a:xfrm>
             <a:prstGeom prst="line">
@@ -14281,7 +13959,7 @@
           </p:nvCxnSpPr>
           <p:spPr>
             <a:xfrm>
-              <a:off x="6601267" y="3173073"/>
+              <a:off x="6601267" y="3303697"/>
               <a:ext cx="904837" cy="508"/>
             </a:xfrm>
             <a:prstGeom prst="line">
@@ -14322,7 +14000,7 @@
           </p:nvSpPr>
           <p:spPr>
             <a:xfrm>
-              <a:off x="8780850" y="2137822"/>
+              <a:off x="8780850" y="2268446"/>
               <a:ext cx="383486" cy="383486"/>
             </a:xfrm>
             <a:prstGeom prst="rect">
@@ -14383,7 +14061,7 @@
           </p:nvCxnSpPr>
           <p:spPr>
             <a:xfrm flipH="1" flipV="1">
-              <a:off x="7889593" y="1613150"/>
+              <a:off x="7889593" y="1743774"/>
               <a:ext cx="891257" cy="716415"/>
             </a:xfrm>
             <a:prstGeom prst="line">
@@ -14428,7 +14106,7 @@
           </p:nvCxnSpPr>
           <p:spPr>
             <a:xfrm flipH="1" flipV="1">
-              <a:off x="7889592" y="2199324"/>
+              <a:off x="7889592" y="2329948"/>
               <a:ext cx="891258" cy="130241"/>
             </a:xfrm>
             <a:prstGeom prst="line">
@@ -14473,7 +14151,7 @@
           </p:nvCxnSpPr>
           <p:spPr>
             <a:xfrm flipH="1">
-              <a:off x="7889590" y="2329565"/>
+              <a:off x="7889590" y="2460189"/>
               <a:ext cx="891260" cy="844016"/>
             </a:xfrm>
             <a:prstGeom prst="line">
@@ -14514,7 +14192,7 @@
           </p:nvSpPr>
           <p:spPr>
             <a:xfrm rot="5400000">
-              <a:off x="6268457" y="2553244"/>
+              <a:off x="6268457" y="2683868"/>
               <a:ext cx="401773" cy="338554"/>
             </a:xfrm>
             <a:prstGeom prst="rect">
@@ -14550,7 +14228,7 @@
           </p:nvSpPr>
           <p:spPr>
             <a:xfrm>
-              <a:off x="3865044" y="1276783"/>
+              <a:off x="3865044" y="1497841"/>
               <a:ext cx="1003035" cy="276999"/>
             </a:xfrm>
             <a:prstGeom prst="rect">
@@ -14586,7 +14264,7 @@
           </p:nvSpPr>
           <p:spPr>
             <a:xfrm>
-              <a:off x="5183359" y="918161"/>
+              <a:off x="5183359" y="1048785"/>
               <a:ext cx="730920" cy="461665"/>
             </a:xfrm>
             <a:prstGeom prst="rect">
@@ -14622,7 +14300,7 @@
           </p:nvSpPr>
           <p:spPr>
             <a:xfrm>
-              <a:off x="7336736" y="895189"/>
+              <a:off x="7336736" y="1025813"/>
               <a:ext cx="730920" cy="461665"/>
             </a:xfrm>
             <a:prstGeom prst="rect">
@@ -14658,7 +14336,7 @@
           </p:nvSpPr>
           <p:spPr>
             <a:xfrm>
-              <a:off x="8506962" y="1853519"/>
+              <a:off x="8506962" y="1984143"/>
               <a:ext cx="922414" cy="276999"/>
             </a:xfrm>
             <a:prstGeom prst="rect">
@@ -14680,148 +14358,6 @@
             </a:p>
           </p:txBody>
         </p:sp>
-        <p:sp>
-          <p:nvSpPr>
-            <p:cNvPr id="304" name="Rectangle 303">
-              <a:extLst>
-                <a:ext uri="{FF2B5EF4-FFF2-40B4-BE49-F238E27FC236}">
-                  <a16:creationId xmlns:a16="http://schemas.microsoft.com/office/drawing/2014/main" id="{5A8178FC-794D-BD45-A8F3-75202E5851C7}"/>
-                </a:ext>
-              </a:extLst>
-            </p:cNvPr>
-            <p:cNvSpPr/>
-            <p:nvPr/>
-          </p:nvSpPr>
-          <p:spPr>
-            <a:xfrm>
-              <a:off x="2419292" y="1870555"/>
-              <a:ext cx="1310827" cy="1080042"/>
-            </a:xfrm>
-            <a:prstGeom prst="rect">
-              <a:avLst/>
-            </a:prstGeom>
-            <a:solidFill>
-              <a:schemeClr val="bg2">
-                <a:lumMod val="50000"/>
-              </a:schemeClr>
-            </a:solidFill>
-            <a:ln>
-              <a:solidFill>
-                <a:schemeClr val="bg1"/>
-              </a:solidFill>
-            </a:ln>
-          </p:spPr>
-          <p:style>
-            <a:lnRef idx="2">
-              <a:schemeClr val="accent1">
-                <a:shade val="50000"/>
-              </a:schemeClr>
-            </a:lnRef>
-            <a:fillRef idx="1">
-              <a:schemeClr val="accent1"/>
-            </a:fillRef>
-            <a:effectRef idx="0">
-              <a:schemeClr val="accent1"/>
-            </a:effectRef>
-            <a:fontRef idx="minor">
-              <a:schemeClr val="lt1"/>
-            </a:fontRef>
-          </p:style>
-          <p:txBody>
-            <a:bodyPr rtlCol="0" anchor="ctr"/>
-            <a:lstStyle/>
-            <a:p>
-              <a:pPr algn="ctr"/>
-              <a:endParaRPr lang="en-US"/>
-            </a:p>
-          </p:txBody>
-        </p:sp>
-        <p:sp>
-          <p:nvSpPr>
-            <p:cNvPr id="305" name="Rectangle 304">
-              <a:extLst>
-                <a:ext uri="{FF2B5EF4-FFF2-40B4-BE49-F238E27FC236}">
-                  <a16:creationId xmlns:a16="http://schemas.microsoft.com/office/drawing/2014/main" id="{ED002556-EE8C-0F4F-80EA-8B833DF65062}"/>
-                </a:ext>
-              </a:extLst>
-            </p:cNvPr>
-            <p:cNvSpPr/>
-            <p:nvPr/>
-          </p:nvSpPr>
-          <p:spPr>
-            <a:xfrm>
-              <a:off x="2508630" y="1947281"/>
-              <a:ext cx="1310827" cy="1080042"/>
-            </a:xfrm>
-            <a:prstGeom prst="rect">
-              <a:avLst/>
-            </a:prstGeom>
-            <a:solidFill>
-              <a:schemeClr val="bg2">
-                <a:lumMod val="50000"/>
-              </a:schemeClr>
-            </a:solidFill>
-            <a:ln>
-              <a:solidFill>
-                <a:schemeClr val="bg1"/>
-              </a:solidFill>
-            </a:ln>
-          </p:spPr>
-          <p:style>
-            <a:lnRef idx="2">
-              <a:schemeClr val="accent1">
-                <a:shade val="50000"/>
-              </a:schemeClr>
-            </a:lnRef>
-            <a:fillRef idx="1">
-              <a:schemeClr val="accent1"/>
-            </a:fillRef>
-            <a:effectRef idx="0">
-              <a:schemeClr val="accent1"/>
-            </a:effectRef>
-            <a:fontRef idx="minor">
-              <a:schemeClr val="lt1"/>
-            </a:fontRef>
-          </p:style>
-          <p:txBody>
-            <a:bodyPr rtlCol="0" anchor="ctr"/>
-            <a:lstStyle/>
-            <a:p>
-              <a:pPr algn="ctr"/>
-              <a:endParaRPr lang="en-US"/>
-            </a:p>
-          </p:txBody>
-        </p:sp>
-        <p:pic>
-          <p:nvPicPr>
-            <p:cNvPr id="306" name="Picture 305">
-              <a:extLst>
-                <a:ext uri="{FF2B5EF4-FFF2-40B4-BE49-F238E27FC236}">
-                  <a16:creationId xmlns:a16="http://schemas.microsoft.com/office/drawing/2014/main" id="{6BF4CCC9-ACCE-7749-91B5-264A3274FB04}"/>
-                </a:ext>
-              </a:extLst>
-            </p:cNvPr>
-            <p:cNvPicPr>
-              <a:picLocks noChangeAspect="1"/>
-            </p:cNvPicPr>
-            <p:nvPr/>
-          </p:nvPicPr>
-          <p:blipFill>
-            <a:blip r:embed="rId2"/>
-            <a:stretch>
-              <a:fillRect/>
-            </a:stretch>
-          </p:blipFill>
-          <p:spPr>
-            <a:xfrm>
-              <a:off x="2587980" y="2024007"/>
-              <a:ext cx="1320815" cy="1080042"/>
-            </a:xfrm>
-            <a:prstGeom prst="rect">
-              <a:avLst/>
-            </a:prstGeom>
-          </p:spPr>
-        </p:pic>
         <p:sp>
           <p:nvSpPr>
             <p:cNvPr id="308" name="TextBox 307">
@@ -14872,7 +14408,7 @@
           </p:nvSpPr>
           <p:spPr>
             <a:xfrm rot="5400000">
-              <a:off x="4207184" y="2560878"/>
+              <a:off x="4207184" y="2691502"/>
               <a:ext cx="401773" cy="338554"/>
             </a:xfrm>
             <a:prstGeom prst="rect">
@@ -14960,6 +14496,408 @@
               <a:r>
                 <a:rPr lang="en-US" sz="1500" b="1" dirty="0"/>
                 <a:t>b) CNN2 architecture</a:t>
+              </a:r>
+            </a:p>
+          </p:txBody>
+        </p:sp>
+        <p:grpSp>
+          <p:nvGrpSpPr>
+            <p:cNvPr id="7" name="Group 6">
+              <a:extLst>
+                <a:ext uri="{FF2B5EF4-FFF2-40B4-BE49-F238E27FC236}">
+                  <a16:creationId xmlns:a16="http://schemas.microsoft.com/office/drawing/2014/main" id="{5684478B-376D-1346-ACD1-95A837A932C6}"/>
+                </a:ext>
+              </a:extLst>
+            </p:cNvPr>
+            <p:cNvGrpSpPr/>
+            <p:nvPr/>
+          </p:nvGrpSpPr>
+          <p:grpSpPr>
+            <a:xfrm>
+              <a:off x="2425108" y="1816593"/>
+              <a:ext cx="1580652" cy="1404734"/>
+              <a:chOff x="26237" y="2189903"/>
+              <a:chExt cx="1580652" cy="1404734"/>
+            </a:xfrm>
+          </p:grpSpPr>
+          <p:pic>
+            <p:nvPicPr>
+              <p:cNvPr id="2" name="Picture 1">
+                <a:extLst>
+                  <a:ext uri="{FF2B5EF4-FFF2-40B4-BE49-F238E27FC236}">
+                    <a16:creationId xmlns:a16="http://schemas.microsoft.com/office/drawing/2014/main" id="{EC1A9541-3489-034E-BBFE-A3FE84E3367E}"/>
+                  </a:ext>
+                </a:extLst>
+              </p:cNvPr>
+              <p:cNvPicPr>
+                <a:picLocks noChangeAspect="1"/>
+              </p:cNvPicPr>
+              <p:nvPr/>
+            </p:nvPicPr>
+            <p:blipFill>
+              <a:blip r:embed="rId2"/>
+              <a:stretch>
+                <a:fillRect/>
+              </a:stretch>
+            </p:blipFill>
+            <p:spPr>
+              <a:xfrm>
+                <a:off x="26237" y="2189903"/>
+                <a:ext cx="1206527" cy="983170"/>
+              </a:xfrm>
+              <a:prstGeom prst="rect">
+                <a:avLst/>
+              </a:prstGeom>
+            </p:spPr>
+          </p:pic>
+          <p:pic>
+            <p:nvPicPr>
+              <p:cNvPr id="4" name="Picture 3">
+                <a:extLst>
+                  <a:ext uri="{FF2B5EF4-FFF2-40B4-BE49-F238E27FC236}">
+                    <a16:creationId xmlns:a16="http://schemas.microsoft.com/office/drawing/2014/main" id="{AD6EC0F4-6FD6-B14A-929A-B0B528A30B4C}"/>
+                  </a:ext>
+                </a:extLst>
+              </p:cNvPr>
+              <p:cNvPicPr>
+                <a:picLocks noChangeAspect="1"/>
+              </p:cNvPicPr>
+              <p:nvPr/>
+            </p:nvPicPr>
+            <p:blipFill>
+              <a:blip r:embed="rId3"/>
+              <a:stretch>
+                <a:fillRect/>
+              </a:stretch>
+            </p:blipFill>
+            <p:spPr>
+              <a:xfrm>
+                <a:off x="180976" y="2422426"/>
+                <a:ext cx="1206527" cy="981176"/>
+              </a:xfrm>
+              <a:prstGeom prst="rect">
+                <a:avLst/>
+              </a:prstGeom>
+            </p:spPr>
+          </p:pic>
+          <p:pic>
+            <p:nvPicPr>
+              <p:cNvPr id="5" name="Picture 4">
+                <a:extLst>
+                  <a:ext uri="{FF2B5EF4-FFF2-40B4-BE49-F238E27FC236}">
+                    <a16:creationId xmlns:a16="http://schemas.microsoft.com/office/drawing/2014/main" id="{DB0AAD4F-073E-0A40-8972-229EAF8ACBBF}"/>
+                  </a:ext>
+                </a:extLst>
+              </p:cNvPr>
+              <p:cNvPicPr>
+                <a:picLocks noChangeAspect="1"/>
+              </p:cNvPicPr>
+              <p:nvPr/>
+            </p:nvPicPr>
+            <p:blipFill>
+              <a:blip r:embed="rId4"/>
+              <a:stretch>
+                <a:fillRect/>
+              </a:stretch>
+            </p:blipFill>
+            <p:spPr>
+              <a:xfrm>
+                <a:off x="402356" y="2613461"/>
+                <a:ext cx="1204533" cy="981176"/>
+              </a:xfrm>
+              <a:prstGeom prst="rect">
+                <a:avLst/>
+              </a:prstGeom>
+            </p:spPr>
+          </p:pic>
+        </p:grpSp>
+        <p:grpSp>
+          <p:nvGrpSpPr>
+            <p:cNvPr id="132" name="Group 131">
+              <a:extLst>
+                <a:ext uri="{FF2B5EF4-FFF2-40B4-BE49-F238E27FC236}">
+                  <a16:creationId xmlns:a16="http://schemas.microsoft.com/office/drawing/2014/main" id="{0698342E-D3FE-C742-92BA-E4FE606B87EA}"/>
+                </a:ext>
+              </a:extLst>
+            </p:cNvPr>
+            <p:cNvGrpSpPr/>
+            <p:nvPr/>
+          </p:nvGrpSpPr>
+          <p:grpSpPr>
+            <a:xfrm>
+              <a:off x="2250048" y="4326474"/>
+              <a:ext cx="1580652" cy="1404734"/>
+              <a:chOff x="26237" y="2189903"/>
+              <a:chExt cx="1580652" cy="1404734"/>
+            </a:xfrm>
+          </p:grpSpPr>
+          <p:pic>
+            <p:nvPicPr>
+              <p:cNvPr id="133" name="Picture 132">
+                <a:extLst>
+                  <a:ext uri="{FF2B5EF4-FFF2-40B4-BE49-F238E27FC236}">
+                    <a16:creationId xmlns:a16="http://schemas.microsoft.com/office/drawing/2014/main" id="{1B504BE8-D51F-5A46-A517-F9550DD84E25}"/>
+                  </a:ext>
+                </a:extLst>
+              </p:cNvPr>
+              <p:cNvPicPr>
+                <a:picLocks noChangeAspect="1"/>
+              </p:cNvPicPr>
+              <p:nvPr/>
+            </p:nvPicPr>
+            <p:blipFill>
+              <a:blip r:embed="rId2"/>
+              <a:stretch>
+                <a:fillRect/>
+              </a:stretch>
+            </p:blipFill>
+            <p:spPr>
+              <a:xfrm>
+                <a:off x="26237" y="2189903"/>
+                <a:ext cx="1206527" cy="983170"/>
+              </a:xfrm>
+              <a:prstGeom prst="rect">
+                <a:avLst/>
+              </a:prstGeom>
+            </p:spPr>
+          </p:pic>
+          <p:pic>
+            <p:nvPicPr>
+              <p:cNvPr id="136" name="Picture 135">
+                <a:extLst>
+                  <a:ext uri="{FF2B5EF4-FFF2-40B4-BE49-F238E27FC236}">
+                    <a16:creationId xmlns:a16="http://schemas.microsoft.com/office/drawing/2014/main" id="{5C07C9E1-40F6-7F45-84ED-50BB4BB1AA37}"/>
+                  </a:ext>
+                </a:extLst>
+              </p:cNvPr>
+              <p:cNvPicPr>
+                <a:picLocks noChangeAspect="1"/>
+              </p:cNvPicPr>
+              <p:nvPr/>
+            </p:nvPicPr>
+            <p:blipFill>
+              <a:blip r:embed="rId3"/>
+              <a:stretch>
+                <a:fillRect/>
+              </a:stretch>
+            </p:blipFill>
+            <p:spPr>
+              <a:xfrm>
+                <a:off x="180976" y="2422426"/>
+                <a:ext cx="1206527" cy="981176"/>
+              </a:xfrm>
+              <a:prstGeom prst="rect">
+                <a:avLst/>
+              </a:prstGeom>
+            </p:spPr>
+          </p:pic>
+          <p:pic>
+            <p:nvPicPr>
+              <p:cNvPr id="137" name="Picture 136">
+                <a:extLst>
+                  <a:ext uri="{FF2B5EF4-FFF2-40B4-BE49-F238E27FC236}">
+                    <a16:creationId xmlns:a16="http://schemas.microsoft.com/office/drawing/2014/main" id="{A8D2AB94-B5AF-D248-B6F0-77421A6C08AE}"/>
+                  </a:ext>
+                </a:extLst>
+              </p:cNvPr>
+              <p:cNvPicPr>
+                <a:picLocks noChangeAspect="1"/>
+              </p:cNvPicPr>
+              <p:nvPr/>
+            </p:nvPicPr>
+            <p:blipFill>
+              <a:blip r:embed="rId4"/>
+              <a:stretch>
+                <a:fillRect/>
+              </a:stretch>
+            </p:blipFill>
+            <p:spPr>
+              <a:xfrm>
+                <a:off x="402356" y="2613461"/>
+                <a:ext cx="1204533" cy="981176"/>
+              </a:xfrm>
+              <a:prstGeom prst="rect">
+                <a:avLst/>
+              </a:prstGeom>
+            </p:spPr>
+          </p:pic>
+        </p:grpSp>
+        <p:sp>
+          <p:nvSpPr>
+            <p:cNvPr id="141" name="Rectangle 140">
+              <a:extLst>
+                <a:ext uri="{FF2B5EF4-FFF2-40B4-BE49-F238E27FC236}">
+                  <a16:creationId xmlns:a16="http://schemas.microsoft.com/office/drawing/2014/main" id="{62673EA8-C410-4241-8056-9CADD4728B23}"/>
+                </a:ext>
+              </a:extLst>
+            </p:cNvPr>
+            <p:cNvSpPr/>
+            <p:nvPr/>
+          </p:nvSpPr>
+          <p:spPr>
+            <a:xfrm rot="5400000">
+              <a:off x="3071411" y="5193825"/>
+              <a:ext cx="102307" cy="185738"/>
+            </a:xfrm>
+            <a:prstGeom prst="rect">
+              <a:avLst/>
+            </a:prstGeom>
+            <a:noFill/>
+            <a:ln>
+              <a:solidFill>
+                <a:schemeClr val="tx1"/>
+              </a:solidFill>
+            </a:ln>
+          </p:spPr>
+          <p:style>
+            <a:lnRef idx="2">
+              <a:schemeClr val="accent1">
+                <a:shade val="50000"/>
+              </a:schemeClr>
+            </a:lnRef>
+            <a:fillRef idx="1">
+              <a:schemeClr val="accent1"/>
+            </a:fillRef>
+            <a:effectRef idx="0">
+              <a:schemeClr val="accent1"/>
+            </a:effectRef>
+            <a:fontRef idx="minor">
+              <a:schemeClr val="lt1"/>
+            </a:fontRef>
+          </p:style>
+          <p:txBody>
+            <a:bodyPr rtlCol="0" anchor="ctr"/>
+            <a:lstStyle/>
+            <a:p>
+              <a:pPr algn="ctr"/>
+              <a:endParaRPr lang="en-US"/>
+            </a:p>
+          </p:txBody>
+        </p:sp>
+        <p:cxnSp>
+          <p:nvCxnSpPr>
+            <p:cNvPr id="152" name="Straight Connector 151">
+              <a:extLst>
+                <a:ext uri="{FF2B5EF4-FFF2-40B4-BE49-F238E27FC236}">
+                  <a16:creationId xmlns:a16="http://schemas.microsoft.com/office/drawing/2014/main" id="{CF07DBD7-973C-B244-AE52-E1CD022BBF90}"/>
+                </a:ext>
+              </a:extLst>
+            </p:cNvPr>
+            <p:cNvCxnSpPr>
+              <a:cxnSpLocks/>
+              <a:stCxn id="141" idx="1"/>
+              <a:endCxn id="149" idx="0"/>
+            </p:cNvCxnSpPr>
+            <p:nvPr/>
+          </p:nvCxnSpPr>
+          <p:spPr>
+            <a:xfrm flipV="1">
+              <a:off x="3122565" y="4819874"/>
+              <a:ext cx="1685105" cy="415667"/>
+            </a:xfrm>
+            <a:prstGeom prst="line">
+              <a:avLst/>
+            </a:prstGeom>
+            <a:ln w="19050">
+              <a:solidFill>
+                <a:srgbClr val="0070C0"/>
+              </a:solidFill>
+              <a:prstDash val="sysDash"/>
+            </a:ln>
+          </p:spPr>
+          <p:style>
+            <a:lnRef idx="1">
+              <a:schemeClr val="accent1"/>
+            </a:lnRef>
+            <a:fillRef idx="0">
+              <a:schemeClr val="accent1"/>
+            </a:fillRef>
+            <a:effectRef idx="0">
+              <a:schemeClr val="accent1"/>
+            </a:effectRef>
+            <a:fontRef idx="minor">
+              <a:schemeClr val="tx1"/>
+            </a:fontRef>
+          </p:style>
+        </p:cxnSp>
+        <p:cxnSp>
+          <p:nvCxnSpPr>
+            <p:cNvPr id="153" name="Straight Connector 152">
+              <a:extLst>
+                <a:ext uri="{FF2B5EF4-FFF2-40B4-BE49-F238E27FC236}">
+                  <a16:creationId xmlns:a16="http://schemas.microsoft.com/office/drawing/2014/main" id="{57D8329D-95EA-2E48-B35B-865F91FF4445}"/>
+                </a:ext>
+              </a:extLst>
+            </p:cNvPr>
+            <p:cNvCxnSpPr>
+              <a:cxnSpLocks/>
+              <a:stCxn id="141" idx="3"/>
+              <a:endCxn id="149" idx="2"/>
+            </p:cNvCxnSpPr>
+            <p:nvPr/>
+          </p:nvCxnSpPr>
+          <p:spPr>
+            <a:xfrm>
+              <a:off x="3122565" y="5337848"/>
+              <a:ext cx="1685105" cy="386752"/>
+            </a:xfrm>
+            <a:prstGeom prst="line">
+              <a:avLst/>
+            </a:prstGeom>
+            <a:ln w="19050">
+              <a:solidFill>
+                <a:srgbClr val="0070C0"/>
+              </a:solidFill>
+              <a:prstDash val="sysDash"/>
+            </a:ln>
+          </p:spPr>
+          <p:style>
+            <a:lnRef idx="1">
+              <a:schemeClr val="accent1"/>
+            </a:lnRef>
+            <a:fillRef idx="0">
+              <a:schemeClr val="accent1"/>
+            </a:fillRef>
+            <a:effectRef idx="0">
+              <a:schemeClr val="accent1"/>
+            </a:effectRef>
+            <a:fontRef idx="minor">
+              <a:schemeClr val="tx1"/>
+            </a:fontRef>
+          </p:style>
+        </p:cxnSp>
+        <p:sp>
+          <p:nvSpPr>
+            <p:cNvPr id="247" name="TextBox 246">
+              <a:extLst>
+                <a:ext uri="{FF2B5EF4-FFF2-40B4-BE49-F238E27FC236}">
+                  <a16:creationId xmlns:a16="http://schemas.microsoft.com/office/drawing/2014/main" id="{3002A90C-650F-6341-A459-9F8DDA11F35F}"/>
+                </a:ext>
+              </a:extLst>
+            </p:cNvPr>
+            <p:cNvSpPr txBox="1"/>
+            <p:nvPr/>
+          </p:nvSpPr>
+          <p:spPr>
+            <a:xfrm>
+              <a:off x="2605110" y="5140017"/>
+              <a:ext cx="559756" cy="276999"/>
+            </a:xfrm>
+            <a:prstGeom prst="rect">
+              <a:avLst/>
+            </a:prstGeom>
+            <a:noFill/>
+          </p:spPr>
+          <p:txBody>
+            <a:bodyPr wrap="square" rtlCol="0">
+              <a:spAutoFit/>
+            </a:bodyPr>
+            <a:lstStyle/>
+            <a:p>
+              <a:pPr algn="ctr"/>
+              <a:r>
+                <a:rPr lang="en-US" sz="1200" dirty="0"/>
+                <a:t>2x3</a:t>
               </a:r>
             </a:p>
           </p:txBody>

</xml_diff>